<commit_message>
GitHub Tutorial for KYU Students 추가
GitHub DeskTop 사용법
</commit_message>
<xml_diff>
--- a/Git Tutorial for Beginners.pptx
+++ b/Git Tutorial for Beginners.pptx
@@ -8,6 +8,11 @@
     <p:sldId id="256" r:id="rId2"/>
     <p:sldId id="257" r:id="rId3"/>
     <p:sldId id="258" r:id="rId4"/>
+    <p:sldId id="259" r:id="rId5"/>
+    <p:sldId id="260" r:id="rId6"/>
+    <p:sldId id="261" r:id="rId7"/>
+    <p:sldId id="262" r:id="rId8"/>
+    <p:sldId id="263" r:id="rId9"/>
   </p:sldIdLst>
   <p:sldSz cx="12192000" cy="6858000"/>
   <p:notesSz cx="6858000" cy="9144000"/>
@@ -11000,6 +11005,568 @@
 </p:sld>
 </file>
 
+<file path=ppt/slides/slide4.xml><?xml version="1.0" encoding="utf-8"?>
+<p:sld xmlns:a="http://schemas.openxmlformats.org/drawingml/2006/main" xmlns:r="http://schemas.openxmlformats.org/officeDocument/2006/relationships" xmlns:p="http://schemas.openxmlformats.org/presentationml/2006/main">
+  <p:cSld>
+    <p:spTree>
+      <p:nvGrpSpPr>
+        <p:cNvPr id="1" name=""/>
+        <p:cNvGrpSpPr/>
+        <p:nvPr/>
+      </p:nvGrpSpPr>
+      <p:grpSpPr>
+        <a:xfrm>
+          <a:off x="0" y="0"/>
+          <a:ext cx="0" cy="0"/>
+          <a:chOff x="0" y="0"/>
+          <a:chExt cx="0" cy="0"/>
+        </a:xfrm>
+      </p:grpSpPr>
+      <p:sp>
+        <p:nvSpPr>
+          <p:cNvPr id="2" name="제목 1">
+            <a:extLst>
+              <a:ext uri="{FF2B5EF4-FFF2-40B4-BE49-F238E27FC236}">
+                <a16:creationId xmlns:a16="http://schemas.microsoft.com/office/drawing/2014/main" id="{8B3752C3-467A-4897-B1A9-E062826269AC}"/>
+              </a:ext>
+            </a:extLst>
+          </p:cNvPr>
+          <p:cNvSpPr>
+            <a:spLocks noGrp="1"/>
+          </p:cNvSpPr>
+          <p:nvPr>
+            <p:ph type="title"/>
+          </p:nvPr>
+        </p:nvSpPr>
+        <p:spPr/>
+        <p:txBody>
+          <a:bodyPr/>
+          <a:lstStyle/>
+          <a:p>
+            <a:endParaRPr lang="ko-KR" altLang="en-US"/>
+          </a:p>
+        </p:txBody>
+      </p:sp>
+      <p:sp>
+        <p:nvSpPr>
+          <p:cNvPr id="3" name="내용 개체 틀 2">
+            <a:extLst>
+              <a:ext uri="{FF2B5EF4-FFF2-40B4-BE49-F238E27FC236}">
+                <a16:creationId xmlns:a16="http://schemas.microsoft.com/office/drawing/2014/main" id="{2238FB28-9B63-4F20-BC54-5BB89E6C8E4D}"/>
+              </a:ext>
+            </a:extLst>
+          </p:cNvPr>
+          <p:cNvSpPr>
+            <a:spLocks noGrp="1"/>
+          </p:cNvSpPr>
+          <p:nvPr>
+            <p:ph idx="1"/>
+          </p:nvPr>
+        </p:nvSpPr>
+        <p:spPr/>
+        <p:txBody>
+          <a:bodyPr/>
+          <a:lstStyle/>
+          <a:p>
+            <a:endParaRPr lang="ko-KR" altLang="en-US"/>
+          </a:p>
+        </p:txBody>
+      </p:sp>
+      <p:pic>
+        <p:nvPicPr>
+          <p:cNvPr id="4" name="그림 3">
+            <a:extLst>
+              <a:ext uri="{FF2B5EF4-FFF2-40B4-BE49-F238E27FC236}">
+                <a16:creationId xmlns:a16="http://schemas.microsoft.com/office/drawing/2014/main" id="{7DCBAAF8-9227-440F-812B-0E4F6CB09123}"/>
+              </a:ext>
+            </a:extLst>
+          </p:cNvPr>
+          <p:cNvPicPr>
+            <a:picLocks noChangeAspect="1"/>
+          </p:cNvPicPr>
+          <p:nvPr/>
+        </p:nvPicPr>
+        <p:blipFill>
+          <a:blip r:embed="rId2"/>
+          <a:stretch>
+            <a:fillRect/>
+          </a:stretch>
+        </p:blipFill>
+        <p:spPr>
+          <a:xfrm>
+            <a:off x="0" y="127000"/>
+            <a:ext cx="12192000" cy="6604000"/>
+          </a:xfrm>
+          <a:prstGeom prst="rect">
+            <a:avLst/>
+          </a:prstGeom>
+        </p:spPr>
+      </p:pic>
+    </p:spTree>
+    <p:extLst>
+      <p:ext uri="{BB962C8B-B14F-4D97-AF65-F5344CB8AC3E}">
+        <p14:creationId xmlns:p14="http://schemas.microsoft.com/office/powerpoint/2010/main" val="920401973"/>
+      </p:ext>
+    </p:extLst>
+  </p:cSld>
+  <p:clrMapOvr>
+    <a:masterClrMapping/>
+  </p:clrMapOvr>
+</p:sld>
+</file>
+
+<file path=ppt/slides/slide5.xml><?xml version="1.0" encoding="utf-8"?>
+<p:sld xmlns:a="http://schemas.openxmlformats.org/drawingml/2006/main" xmlns:r="http://schemas.openxmlformats.org/officeDocument/2006/relationships" xmlns:p="http://schemas.openxmlformats.org/presentationml/2006/main">
+  <p:cSld>
+    <p:spTree>
+      <p:nvGrpSpPr>
+        <p:cNvPr id="1" name=""/>
+        <p:cNvGrpSpPr/>
+        <p:nvPr/>
+      </p:nvGrpSpPr>
+      <p:grpSpPr>
+        <a:xfrm>
+          <a:off x="0" y="0"/>
+          <a:ext cx="0" cy="0"/>
+          <a:chOff x="0" y="0"/>
+          <a:chExt cx="0" cy="0"/>
+        </a:xfrm>
+      </p:grpSpPr>
+      <p:sp>
+        <p:nvSpPr>
+          <p:cNvPr id="2" name="제목 1">
+            <a:extLst>
+              <a:ext uri="{FF2B5EF4-FFF2-40B4-BE49-F238E27FC236}">
+                <a16:creationId xmlns:a16="http://schemas.microsoft.com/office/drawing/2014/main" id="{F5880E3C-0F28-45F1-B090-DD919777B0C1}"/>
+              </a:ext>
+            </a:extLst>
+          </p:cNvPr>
+          <p:cNvSpPr>
+            <a:spLocks noGrp="1"/>
+          </p:cNvSpPr>
+          <p:nvPr>
+            <p:ph type="title"/>
+          </p:nvPr>
+        </p:nvSpPr>
+        <p:spPr/>
+        <p:txBody>
+          <a:bodyPr/>
+          <a:lstStyle/>
+          <a:p>
+            <a:endParaRPr lang="ko-KR" altLang="en-US"/>
+          </a:p>
+        </p:txBody>
+      </p:sp>
+      <p:sp>
+        <p:nvSpPr>
+          <p:cNvPr id="3" name="내용 개체 틀 2">
+            <a:extLst>
+              <a:ext uri="{FF2B5EF4-FFF2-40B4-BE49-F238E27FC236}">
+                <a16:creationId xmlns:a16="http://schemas.microsoft.com/office/drawing/2014/main" id="{A5ED07A1-F3AB-4C1C-BB86-D35DBD3A0985}"/>
+              </a:ext>
+            </a:extLst>
+          </p:cNvPr>
+          <p:cNvSpPr>
+            <a:spLocks noGrp="1"/>
+          </p:cNvSpPr>
+          <p:nvPr>
+            <p:ph idx="1"/>
+          </p:nvPr>
+        </p:nvSpPr>
+        <p:spPr/>
+        <p:txBody>
+          <a:bodyPr/>
+          <a:lstStyle/>
+          <a:p>
+            <a:endParaRPr lang="ko-KR" altLang="en-US"/>
+          </a:p>
+        </p:txBody>
+      </p:sp>
+      <p:pic>
+        <p:nvPicPr>
+          <p:cNvPr id="4" name="그림 3">
+            <a:extLst>
+              <a:ext uri="{FF2B5EF4-FFF2-40B4-BE49-F238E27FC236}">
+                <a16:creationId xmlns:a16="http://schemas.microsoft.com/office/drawing/2014/main" id="{C3706843-FB99-42EA-9114-F6F0A8EEC24B}"/>
+              </a:ext>
+            </a:extLst>
+          </p:cNvPr>
+          <p:cNvPicPr>
+            <a:picLocks noChangeAspect="1"/>
+          </p:cNvPicPr>
+          <p:nvPr/>
+        </p:nvPicPr>
+        <p:blipFill>
+          <a:blip r:embed="rId2"/>
+          <a:stretch>
+            <a:fillRect/>
+          </a:stretch>
+        </p:blipFill>
+        <p:spPr>
+          <a:xfrm>
+            <a:off x="0" y="127000"/>
+            <a:ext cx="12192000" cy="6604000"/>
+          </a:xfrm>
+          <a:prstGeom prst="rect">
+            <a:avLst/>
+          </a:prstGeom>
+        </p:spPr>
+      </p:pic>
+    </p:spTree>
+    <p:extLst>
+      <p:ext uri="{BB962C8B-B14F-4D97-AF65-F5344CB8AC3E}">
+        <p14:creationId xmlns:p14="http://schemas.microsoft.com/office/powerpoint/2010/main" val="1981299581"/>
+      </p:ext>
+    </p:extLst>
+  </p:cSld>
+  <p:clrMapOvr>
+    <a:masterClrMapping/>
+  </p:clrMapOvr>
+</p:sld>
+</file>
+
+<file path=ppt/slides/slide6.xml><?xml version="1.0" encoding="utf-8"?>
+<p:sld xmlns:a="http://schemas.openxmlformats.org/drawingml/2006/main" xmlns:r="http://schemas.openxmlformats.org/officeDocument/2006/relationships" xmlns:p="http://schemas.openxmlformats.org/presentationml/2006/main">
+  <p:cSld>
+    <p:spTree>
+      <p:nvGrpSpPr>
+        <p:cNvPr id="1" name=""/>
+        <p:cNvGrpSpPr/>
+        <p:nvPr/>
+      </p:nvGrpSpPr>
+      <p:grpSpPr>
+        <a:xfrm>
+          <a:off x="0" y="0"/>
+          <a:ext cx="0" cy="0"/>
+          <a:chOff x="0" y="0"/>
+          <a:chExt cx="0" cy="0"/>
+        </a:xfrm>
+      </p:grpSpPr>
+      <p:sp>
+        <p:nvSpPr>
+          <p:cNvPr id="2" name="제목 1">
+            <a:extLst>
+              <a:ext uri="{FF2B5EF4-FFF2-40B4-BE49-F238E27FC236}">
+                <a16:creationId xmlns:a16="http://schemas.microsoft.com/office/drawing/2014/main" id="{978CF886-4005-4ED5-B64D-B71271262EC6}"/>
+              </a:ext>
+            </a:extLst>
+          </p:cNvPr>
+          <p:cNvSpPr>
+            <a:spLocks noGrp="1"/>
+          </p:cNvSpPr>
+          <p:nvPr>
+            <p:ph type="title"/>
+          </p:nvPr>
+        </p:nvSpPr>
+        <p:spPr/>
+        <p:txBody>
+          <a:bodyPr/>
+          <a:lstStyle/>
+          <a:p>
+            <a:endParaRPr lang="ko-KR" altLang="en-US"/>
+          </a:p>
+        </p:txBody>
+      </p:sp>
+      <p:sp>
+        <p:nvSpPr>
+          <p:cNvPr id="3" name="내용 개체 틀 2">
+            <a:extLst>
+              <a:ext uri="{FF2B5EF4-FFF2-40B4-BE49-F238E27FC236}">
+                <a16:creationId xmlns:a16="http://schemas.microsoft.com/office/drawing/2014/main" id="{5D4DD13C-9E4C-4F40-B8BE-E5509A3896DB}"/>
+              </a:ext>
+            </a:extLst>
+          </p:cNvPr>
+          <p:cNvSpPr>
+            <a:spLocks noGrp="1"/>
+          </p:cNvSpPr>
+          <p:nvPr>
+            <p:ph idx="1"/>
+          </p:nvPr>
+        </p:nvSpPr>
+        <p:spPr/>
+        <p:txBody>
+          <a:bodyPr/>
+          <a:lstStyle/>
+          <a:p>
+            <a:endParaRPr lang="ko-KR" altLang="en-US"/>
+          </a:p>
+        </p:txBody>
+      </p:sp>
+      <p:pic>
+        <p:nvPicPr>
+          <p:cNvPr id="4" name="그림 3">
+            <a:extLst>
+              <a:ext uri="{FF2B5EF4-FFF2-40B4-BE49-F238E27FC236}">
+                <a16:creationId xmlns:a16="http://schemas.microsoft.com/office/drawing/2014/main" id="{3C0DF515-D10D-4248-A3DD-282439884123}"/>
+              </a:ext>
+            </a:extLst>
+          </p:cNvPr>
+          <p:cNvPicPr>
+            <a:picLocks noChangeAspect="1"/>
+          </p:cNvPicPr>
+          <p:nvPr/>
+        </p:nvPicPr>
+        <p:blipFill>
+          <a:blip r:embed="rId2"/>
+          <a:stretch>
+            <a:fillRect/>
+          </a:stretch>
+        </p:blipFill>
+        <p:spPr>
+          <a:xfrm>
+            <a:off x="0" y="127000"/>
+            <a:ext cx="12192000" cy="6604000"/>
+          </a:xfrm>
+          <a:prstGeom prst="rect">
+            <a:avLst/>
+          </a:prstGeom>
+        </p:spPr>
+      </p:pic>
+    </p:spTree>
+    <p:extLst>
+      <p:ext uri="{BB962C8B-B14F-4D97-AF65-F5344CB8AC3E}">
+        <p14:creationId xmlns:p14="http://schemas.microsoft.com/office/powerpoint/2010/main" val="3621785212"/>
+      </p:ext>
+    </p:extLst>
+  </p:cSld>
+  <p:clrMapOvr>
+    <a:masterClrMapping/>
+  </p:clrMapOvr>
+</p:sld>
+</file>
+
+<file path=ppt/slides/slide7.xml><?xml version="1.0" encoding="utf-8"?>
+<p:sld xmlns:a="http://schemas.openxmlformats.org/drawingml/2006/main" xmlns:r="http://schemas.openxmlformats.org/officeDocument/2006/relationships" xmlns:p="http://schemas.openxmlformats.org/presentationml/2006/main">
+  <p:cSld>
+    <p:spTree>
+      <p:nvGrpSpPr>
+        <p:cNvPr id="1" name=""/>
+        <p:cNvGrpSpPr/>
+        <p:nvPr/>
+      </p:nvGrpSpPr>
+      <p:grpSpPr>
+        <a:xfrm>
+          <a:off x="0" y="0"/>
+          <a:ext cx="0" cy="0"/>
+          <a:chOff x="0" y="0"/>
+          <a:chExt cx="0" cy="0"/>
+        </a:xfrm>
+      </p:grpSpPr>
+      <p:sp>
+        <p:nvSpPr>
+          <p:cNvPr id="2" name="제목 1">
+            <a:extLst>
+              <a:ext uri="{FF2B5EF4-FFF2-40B4-BE49-F238E27FC236}">
+                <a16:creationId xmlns:a16="http://schemas.microsoft.com/office/drawing/2014/main" id="{356D674D-6FFA-40BA-BD16-642F5B9C6D48}"/>
+              </a:ext>
+            </a:extLst>
+          </p:cNvPr>
+          <p:cNvSpPr>
+            <a:spLocks noGrp="1"/>
+          </p:cNvSpPr>
+          <p:nvPr>
+            <p:ph type="title"/>
+          </p:nvPr>
+        </p:nvSpPr>
+        <p:spPr/>
+        <p:txBody>
+          <a:bodyPr/>
+          <a:lstStyle/>
+          <a:p>
+            <a:endParaRPr lang="ko-KR" altLang="en-US"/>
+          </a:p>
+        </p:txBody>
+      </p:sp>
+      <p:sp>
+        <p:nvSpPr>
+          <p:cNvPr id="3" name="내용 개체 틀 2">
+            <a:extLst>
+              <a:ext uri="{FF2B5EF4-FFF2-40B4-BE49-F238E27FC236}">
+                <a16:creationId xmlns:a16="http://schemas.microsoft.com/office/drawing/2014/main" id="{3407E588-7E94-4080-95F2-D87AED735436}"/>
+              </a:ext>
+            </a:extLst>
+          </p:cNvPr>
+          <p:cNvSpPr>
+            <a:spLocks noGrp="1"/>
+          </p:cNvSpPr>
+          <p:nvPr>
+            <p:ph idx="1"/>
+          </p:nvPr>
+        </p:nvSpPr>
+        <p:spPr/>
+        <p:txBody>
+          <a:bodyPr/>
+          <a:lstStyle/>
+          <a:p>
+            <a:endParaRPr lang="ko-KR" altLang="en-US"/>
+          </a:p>
+        </p:txBody>
+      </p:sp>
+      <p:pic>
+        <p:nvPicPr>
+          <p:cNvPr id="4" name="그림 3">
+            <a:extLst>
+              <a:ext uri="{FF2B5EF4-FFF2-40B4-BE49-F238E27FC236}">
+                <a16:creationId xmlns:a16="http://schemas.microsoft.com/office/drawing/2014/main" id="{525C48D5-8015-4C82-B08B-110A914EBC3D}"/>
+              </a:ext>
+            </a:extLst>
+          </p:cNvPr>
+          <p:cNvPicPr>
+            <a:picLocks noChangeAspect="1"/>
+          </p:cNvPicPr>
+          <p:nvPr/>
+        </p:nvPicPr>
+        <p:blipFill>
+          <a:blip r:embed="rId2"/>
+          <a:stretch>
+            <a:fillRect/>
+          </a:stretch>
+        </p:blipFill>
+        <p:spPr>
+          <a:xfrm>
+            <a:off x="0" y="127000"/>
+            <a:ext cx="12192000" cy="6604000"/>
+          </a:xfrm>
+          <a:prstGeom prst="rect">
+            <a:avLst/>
+          </a:prstGeom>
+        </p:spPr>
+      </p:pic>
+    </p:spTree>
+    <p:extLst>
+      <p:ext uri="{BB962C8B-B14F-4D97-AF65-F5344CB8AC3E}">
+        <p14:creationId xmlns:p14="http://schemas.microsoft.com/office/powerpoint/2010/main" val="515627647"/>
+      </p:ext>
+    </p:extLst>
+  </p:cSld>
+  <p:clrMapOvr>
+    <a:masterClrMapping/>
+  </p:clrMapOvr>
+</p:sld>
+</file>
+
+<file path=ppt/slides/slide8.xml><?xml version="1.0" encoding="utf-8"?>
+<p:sld xmlns:a="http://schemas.openxmlformats.org/drawingml/2006/main" xmlns:r="http://schemas.openxmlformats.org/officeDocument/2006/relationships" xmlns:p="http://schemas.openxmlformats.org/presentationml/2006/main">
+  <p:cSld>
+    <p:spTree>
+      <p:nvGrpSpPr>
+        <p:cNvPr id="1" name=""/>
+        <p:cNvGrpSpPr/>
+        <p:nvPr/>
+      </p:nvGrpSpPr>
+      <p:grpSpPr>
+        <a:xfrm>
+          <a:off x="0" y="0"/>
+          <a:ext cx="0" cy="0"/>
+          <a:chOff x="0" y="0"/>
+          <a:chExt cx="0" cy="0"/>
+        </a:xfrm>
+      </p:grpSpPr>
+      <p:sp>
+        <p:nvSpPr>
+          <p:cNvPr id="2" name="제목 1">
+            <a:extLst>
+              <a:ext uri="{FF2B5EF4-FFF2-40B4-BE49-F238E27FC236}">
+                <a16:creationId xmlns:a16="http://schemas.microsoft.com/office/drawing/2014/main" id="{CC7910A0-B88F-4396-B769-B49567E990F0}"/>
+              </a:ext>
+            </a:extLst>
+          </p:cNvPr>
+          <p:cNvSpPr>
+            <a:spLocks noGrp="1"/>
+          </p:cNvSpPr>
+          <p:nvPr>
+            <p:ph type="title"/>
+          </p:nvPr>
+        </p:nvSpPr>
+        <p:spPr/>
+        <p:txBody>
+          <a:bodyPr/>
+          <a:lstStyle/>
+          <a:p>
+            <a:r>
+              <a:rPr lang="en-US" altLang="ko-KR" dirty="0"/>
+              <a:t>Clone</a:t>
+            </a:r>
+            <a:r>
+              <a:rPr lang="ko-KR" altLang="en-US" dirty="0"/>
+              <a:t> </a:t>
+            </a:r>
+            <a:r>
+              <a:rPr lang="en-US" altLang="ko-KR" dirty="0"/>
+              <a:t>: remote -&gt; local</a:t>
+            </a:r>
+            <a:endParaRPr lang="ko-KR" altLang="en-US" dirty="0"/>
+          </a:p>
+        </p:txBody>
+      </p:sp>
+      <p:sp>
+        <p:nvSpPr>
+          <p:cNvPr id="3" name="내용 개체 틀 2">
+            <a:extLst>
+              <a:ext uri="{FF2B5EF4-FFF2-40B4-BE49-F238E27FC236}">
+                <a16:creationId xmlns:a16="http://schemas.microsoft.com/office/drawing/2014/main" id="{C4236795-C175-4B98-8B94-BB40EA2F5073}"/>
+              </a:ext>
+            </a:extLst>
+          </p:cNvPr>
+          <p:cNvSpPr>
+            <a:spLocks noGrp="1"/>
+          </p:cNvSpPr>
+          <p:nvPr>
+            <p:ph idx="1"/>
+          </p:nvPr>
+        </p:nvSpPr>
+        <p:spPr/>
+        <p:txBody>
+          <a:bodyPr/>
+          <a:lstStyle/>
+          <a:p>
+            <a:endParaRPr lang="ko-KR" altLang="en-US"/>
+          </a:p>
+        </p:txBody>
+      </p:sp>
+      <p:pic>
+        <p:nvPicPr>
+          <p:cNvPr id="4" name="그림 3">
+            <a:extLst>
+              <a:ext uri="{FF2B5EF4-FFF2-40B4-BE49-F238E27FC236}">
+                <a16:creationId xmlns:a16="http://schemas.microsoft.com/office/drawing/2014/main" id="{4C31B63C-0713-44C1-9EDA-6FF3D837297F}"/>
+              </a:ext>
+            </a:extLst>
+          </p:cNvPr>
+          <p:cNvPicPr>
+            <a:picLocks noChangeAspect="1"/>
+          </p:cNvPicPr>
+          <p:nvPr/>
+        </p:nvPicPr>
+        <p:blipFill>
+          <a:blip r:embed="rId2"/>
+          <a:stretch>
+            <a:fillRect/>
+          </a:stretch>
+        </p:blipFill>
+        <p:spPr>
+          <a:xfrm>
+            <a:off x="609600" y="1069403"/>
+            <a:ext cx="10406130" cy="5636654"/>
+          </a:xfrm>
+          <a:prstGeom prst="rect">
+            <a:avLst/>
+          </a:prstGeom>
+        </p:spPr>
+      </p:pic>
+    </p:spTree>
+    <p:extLst>
+      <p:ext uri="{BB962C8B-B14F-4D97-AF65-F5344CB8AC3E}">
+        <p14:creationId xmlns:p14="http://schemas.microsoft.com/office/powerpoint/2010/main" val="4000295708"/>
+      </p:ext>
+    </p:extLst>
+  </p:cSld>
+  <p:clrMapOvr>
+    <a:masterClrMapping/>
+  </p:clrMapOvr>
+</p:sld>
+</file>
+
 <file path=ppt/theme/theme1.xml><?xml version="1.0" encoding="utf-8"?>
 <a:theme xmlns:a="http://schemas.openxmlformats.org/drawingml/2006/main" name="New_Education02">
   <a:themeElements>

</xml_diff>